<commit_message>
Terminology changes & unification for exploraion
</commit_message>
<xml_diff>
--- a/doc/exploration/figs/figs.pptx
+++ b/doc/exploration/figs/figs.pptx
@@ -104,6 +104,11 @@
       </a:defRPr>
     </a:lvl9pPr>
   </p:defaultTextStyle>
+  <p:extLst>
+    <p:ext uri="{EFAFB233-063F-42B5-8137-9DF3F51BA10A}">
+      <p15:sldGuideLst xmlns:p15="http://schemas.microsoft.com/office/powerpoint/2012/main"/>
+    </p:ext>
+  </p:extLst>
 </p:presentation>
 </file>
 
@@ -3344,10 +3349,10 @@
       </p:grpSpPr>
       <p:sp>
         <p:nvSpPr>
-          <p:cNvPr id="10" name="Oval 9">
-            <a:extLst>
-              <a:ext uri="{FF2B5EF4-FFF2-40B4-BE49-F238E27FC236}">
-                <a16:creationId xmlns:a16="http://schemas.microsoft.com/office/drawing/2014/main" id="{06576DC4-F2F0-0A09-C83E-A0C348F14DDC}"/>
+          <p:cNvPr id="8" name="Oval 7">
+            <a:extLst>
+              <a:ext uri="{FF2B5EF4-FFF2-40B4-BE49-F238E27FC236}">
+                <a16:creationId xmlns:a16="http://schemas.microsoft.com/office/drawing/2014/main" id="{9D2075C2-68E0-C296-7E9A-B627A3D13F22}"/>
               </a:ext>
             </a:extLst>
           </p:cNvPr>
@@ -3356,74 +3361,7 @@
         </p:nvSpPr>
         <p:spPr>
           <a:xfrm>
-            <a:off x="4131485" y="1621892"/>
-            <a:ext cx="4111463" cy="2776572"/>
-          </a:xfrm>
-          <a:prstGeom prst="ellipse">
-            <a:avLst/>
-          </a:prstGeom>
-          <a:solidFill>
-            <a:schemeClr val="tx2">
-              <a:lumMod val="50000"/>
-              <a:lumOff val="50000"/>
-              <a:alpha val="5098"/>
-            </a:schemeClr>
-          </a:solidFill>
-          <a:ln>
-            <a:solidFill>
-              <a:schemeClr val="tx2">
-                <a:lumMod val="75000"/>
-                <a:lumOff val="25000"/>
-              </a:schemeClr>
-            </a:solidFill>
-          </a:ln>
-        </p:spPr>
-        <p:style>
-          <a:lnRef idx="2">
-            <a:schemeClr val="dk1">
-              <a:shade val="15000"/>
-            </a:schemeClr>
-          </a:lnRef>
-          <a:fillRef idx="1">
-            <a:schemeClr val="dk1"/>
-          </a:fillRef>
-          <a:effectRef idx="0">
-            <a:schemeClr val="dk1"/>
-          </a:effectRef>
-          <a:fontRef idx="minor">
-            <a:schemeClr val="lt1"/>
-          </a:fontRef>
-        </p:style>
-        <p:txBody>
-          <a:bodyPr wrap="square" lIns="0" tIns="0" rIns="0" bIns="0" rtlCol="0" anchor="t" anchorCtr="0"/>
-          <a:lstStyle/>
-          <a:p>
-            <a:pPr algn="ctr"/>
-            <a:endParaRPr lang="en-GB" sz="1400" dirty="0">
-              <a:solidFill>
-                <a:schemeClr val="accent4">
-                  <a:lumMod val="50000"/>
-                </a:schemeClr>
-              </a:solidFill>
-            </a:endParaRPr>
-          </a:p>
-        </p:txBody>
-      </p:sp>
-      <p:sp>
-        <p:nvSpPr>
-          <p:cNvPr id="8" name="Oval 7">
-            <a:extLst>
-              <a:ext uri="{FF2B5EF4-FFF2-40B4-BE49-F238E27FC236}">
-                <a16:creationId xmlns:a16="http://schemas.microsoft.com/office/drawing/2014/main" id="{9D2075C2-68E0-C296-7E9A-B627A3D13F22}"/>
-              </a:ext>
-            </a:extLst>
-          </p:cNvPr>
-          <p:cNvSpPr/>
-          <p:nvPr/>
-        </p:nvSpPr>
-        <p:spPr>
-          <a:xfrm>
-            <a:off x="4491907" y="1909450"/>
+            <a:off x="1816035" y="1200847"/>
             <a:ext cx="3423992" cy="2228153"/>
           </a:xfrm>
           <a:prstGeom prst="ellipse">
@@ -3490,8 +3428,8 @@
         </p:nvSpPr>
         <p:spPr>
           <a:xfrm>
-            <a:off x="5933588" y="1838391"/>
-            <a:ext cx="3483486" cy="2446608"/>
+            <a:off x="3151477" y="1200846"/>
+            <a:ext cx="3483486" cy="2228153"/>
           </a:xfrm>
           <a:prstGeom prst="ellipse">
             <a:avLst/>
@@ -3554,7 +3492,7 @@
         </p:nvSpPr>
         <p:spPr>
           <a:xfrm>
-            <a:off x="7781728" y="1898838"/>
+            <a:off x="4718594" y="1241677"/>
             <a:ext cx="571779" cy="215444"/>
           </a:xfrm>
           <a:prstGeom prst="rect">
@@ -3595,8 +3533,8 @@
         </p:nvSpPr>
         <p:spPr>
           <a:xfrm>
-            <a:off x="4885699" y="2190059"/>
-            <a:ext cx="2729850" cy="1707822"/>
+            <a:off x="2457854" y="1474874"/>
+            <a:ext cx="2435101" cy="1707822"/>
           </a:xfrm>
           <a:prstGeom prst="ellipse">
             <a:avLst/>
@@ -3662,7 +3600,7 @@
         </p:nvSpPr>
         <p:spPr>
           <a:xfrm>
-            <a:off x="5696274" y="2238030"/>
+            <a:off x="2545560" y="2238256"/>
             <a:ext cx="514243" cy="215444"/>
           </a:xfrm>
           <a:prstGeom prst="rect">
@@ -3707,8 +3645,8 @@
         </p:nvSpPr>
         <p:spPr>
           <a:xfrm>
-            <a:off x="5616566" y="1957421"/>
-            <a:ext cx="654538" cy="215444"/>
+            <a:off x="3069066" y="1238960"/>
+            <a:ext cx="407869" cy="215444"/>
           </a:xfrm>
           <a:prstGeom prst="rect">
             <a:avLst/>
@@ -3725,59 +3663,6 @@
           <a:lstStyle/>
           <a:p>
             <a:r>
-              <a:rPr lang="en-GB" sz="1400" i="1">
-                <a:solidFill>
-                  <a:schemeClr val="tx2">
-                    <a:lumMod val="75000"/>
-                    <a:lumOff val="25000"/>
-                  </a:schemeClr>
-                </a:solidFill>
-              </a:rPr>
-              <a:t>exposed</a:t>
-            </a:r>
-            <a:endParaRPr lang="en-GB" sz="1400" i="1" dirty="0">
-              <a:solidFill>
-                <a:schemeClr val="tx2">
-                  <a:lumMod val="75000"/>
-                  <a:lumOff val="25000"/>
-                </a:schemeClr>
-              </a:solidFill>
-            </a:endParaRPr>
-          </a:p>
-        </p:txBody>
-      </p:sp>
-      <p:sp>
-        <p:nvSpPr>
-          <p:cNvPr id="11" name="TextBox 10">
-            <a:extLst>
-              <a:ext uri="{FF2B5EF4-FFF2-40B4-BE49-F238E27FC236}">
-                <a16:creationId xmlns:a16="http://schemas.microsoft.com/office/drawing/2014/main" id="{ED301EFE-4E2B-8594-9A65-964E64C107F6}"/>
-              </a:ext>
-            </a:extLst>
-          </p:cNvPr>
-          <p:cNvSpPr txBox="1"/>
-          <p:nvPr/>
-        </p:nvSpPr>
-        <p:spPr>
-          <a:xfrm>
-            <a:off x="5517540" y="1673338"/>
-            <a:ext cx="1351011" cy="215444"/>
-          </a:xfrm>
-          <a:prstGeom prst="rect">
-            <a:avLst/>
-          </a:prstGeom>
-          <a:noFill/>
-          <a:ln>
-            <a:noFill/>
-          </a:ln>
-        </p:spPr>
-        <p:txBody>
-          <a:bodyPr wrap="none" lIns="0" tIns="0" rIns="0" bIns="0" rtlCol="0">
-            <a:spAutoFit/>
-          </a:bodyPr>
-          <a:lstStyle/>
-          <a:p>
-            <a:r>
               <a:rPr lang="en-GB" sz="1400" i="1" dirty="0">
                 <a:solidFill>
                   <a:schemeClr val="tx2">
@@ -3786,7 +3671,7 @@
                   </a:schemeClr>
                 </a:solidFill>
               </a:rPr>
-              <a:t>eventually steady</a:t>
+              <a:t>outer</a:t>
             </a:r>
           </a:p>
         </p:txBody>
@@ -3805,7 +3690,7 @@
         </p:nvSpPr>
         <p:spPr>
           <a:xfrm>
-            <a:off x="6096000" y="2644694"/>
+            <a:off x="3313889" y="1946703"/>
             <a:ext cx="1253120" cy="798551"/>
           </a:xfrm>
           <a:prstGeom prst="ellipse">
@@ -3872,7 +3757,7 @@
         </p:nvSpPr>
         <p:spPr>
           <a:xfrm>
-            <a:off x="6296961" y="2769166"/>
+            <a:off x="3459962" y="2238256"/>
             <a:ext cx="370818" cy="215444"/>
           </a:xfrm>
           <a:prstGeom prst="rect">
@@ -3917,8 +3802,8 @@
         </p:nvSpPr>
         <p:spPr>
           <a:xfrm>
-            <a:off x="6667779" y="2142087"/>
-            <a:ext cx="2496244" cy="1835887"/>
+            <a:off x="3885668" y="1474873"/>
+            <a:ext cx="2515132" cy="1707823"/>
           </a:xfrm>
           <a:prstGeom prst="ellipse">
             <a:avLst/>
@@ -3981,7 +3866,7 @@
         </p:nvSpPr>
         <p:spPr>
           <a:xfrm>
-            <a:off x="8281319" y="2612933"/>
+            <a:off x="5159765" y="1640952"/>
             <a:ext cx="737542" cy="215444"/>
           </a:xfrm>
           <a:prstGeom prst="rect">
@@ -4005,6 +3890,342 @@
               </a:rPr>
               <a:t>complete</a:t>
             </a:r>
+          </a:p>
+        </p:txBody>
+      </p:sp>
+      <p:sp>
+        <p:nvSpPr>
+          <p:cNvPr id="5" name="Oval 4">
+            <a:extLst>
+              <a:ext uri="{FF2B5EF4-FFF2-40B4-BE49-F238E27FC236}">
+                <a16:creationId xmlns:a16="http://schemas.microsoft.com/office/drawing/2014/main" id="{1A155F27-2B4C-50B5-AFD9-0BD7A6895D7F}"/>
+              </a:ext>
+            </a:extLst>
+          </p:cNvPr>
+          <p:cNvSpPr/>
+          <p:nvPr/>
+        </p:nvSpPr>
+        <p:spPr>
+          <a:xfrm>
+            <a:off x="4928557" y="1946703"/>
+            <a:ext cx="1253120" cy="798551"/>
+          </a:xfrm>
+          <a:prstGeom prst="ellipse">
+            <a:avLst/>
+          </a:prstGeom>
+          <a:solidFill>
+            <a:schemeClr val="tx2">
+              <a:lumMod val="50000"/>
+              <a:lumOff val="50000"/>
+              <a:alpha val="5098"/>
+            </a:schemeClr>
+          </a:solidFill>
+          <a:ln>
+            <a:solidFill>
+              <a:schemeClr val="tx2">
+                <a:lumMod val="75000"/>
+                <a:lumOff val="25000"/>
+              </a:schemeClr>
+            </a:solidFill>
+          </a:ln>
+        </p:spPr>
+        <p:style>
+          <a:lnRef idx="2">
+            <a:schemeClr val="dk1">
+              <a:shade val="15000"/>
+            </a:schemeClr>
+          </a:lnRef>
+          <a:fillRef idx="1">
+            <a:schemeClr val="dk1"/>
+          </a:fillRef>
+          <a:effectRef idx="0">
+            <a:schemeClr val="dk1"/>
+          </a:effectRef>
+          <a:fontRef idx="minor">
+            <a:schemeClr val="lt1"/>
+          </a:fontRef>
+        </p:style>
+        <p:txBody>
+          <a:bodyPr wrap="square" lIns="0" tIns="0" rIns="0" bIns="0" rtlCol="0" anchor="t" anchorCtr="0"/>
+          <a:lstStyle/>
+          <a:p>
+            <a:pPr algn="ctr"/>
+            <a:endParaRPr lang="en-GB" sz="1400" dirty="0">
+              <a:solidFill>
+                <a:schemeClr val="accent4">
+                  <a:lumMod val="50000"/>
+                </a:schemeClr>
+              </a:solidFill>
+            </a:endParaRPr>
+          </a:p>
+        </p:txBody>
+      </p:sp>
+      <p:sp>
+        <p:nvSpPr>
+          <p:cNvPr id="6" name="TextBox 5">
+            <a:extLst>
+              <a:ext uri="{FF2B5EF4-FFF2-40B4-BE49-F238E27FC236}">
+                <a16:creationId xmlns:a16="http://schemas.microsoft.com/office/drawing/2014/main" id="{32F26E0C-E661-D207-AAD8-B9B25C56EC29}"/>
+              </a:ext>
+            </a:extLst>
+          </p:cNvPr>
+          <p:cNvSpPr txBox="1"/>
+          <p:nvPr/>
+        </p:nvSpPr>
+        <p:spPr>
+          <a:xfrm>
+            <a:off x="5528536" y="2238256"/>
+            <a:ext cx="551739" cy="215444"/>
+          </a:xfrm>
+          <a:prstGeom prst="rect">
+            <a:avLst/>
+          </a:prstGeom>
+          <a:noFill/>
+          <a:ln>
+            <a:noFill/>
+          </a:ln>
+        </p:spPr>
+        <p:txBody>
+          <a:bodyPr wrap="square" lIns="0" tIns="0" rIns="0" bIns="0" rtlCol="0">
+            <a:spAutoFit/>
+          </a:bodyPr>
+          <a:lstStyle/>
+          <a:p>
+            <a:r>
+              <a:rPr lang="en-GB" sz="1400" i="1" dirty="0">
+                <a:solidFill>
+                  <a:schemeClr val="tx2">
+                    <a:lumMod val="75000"/>
+                    <a:lumOff val="25000"/>
+                  </a:schemeClr>
+                </a:solidFill>
+              </a:rPr>
+              <a:t>absent</a:t>
+            </a:r>
+          </a:p>
+        </p:txBody>
+      </p:sp>
+      <p:sp>
+        <p:nvSpPr>
+          <p:cNvPr id="16" name="TextBox 15">
+            <a:extLst>
+              <a:ext uri="{FF2B5EF4-FFF2-40B4-BE49-F238E27FC236}">
+                <a16:creationId xmlns:a16="http://schemas.microsoft.com/office/drawing/2014/main" id="{F87D5E65-CE22-7BA9-2965-F86BC6C4527E}"/>
+              </a:ext>
+            </a:extLst>
+          </p:cNvPr>
+          <p:cNvSpPr txBox="1"/>
+          <p:nvPr/>
+        </p:nvSpPr>
+        <p:spPr>
+          <a:xfrm>
+            <a:off x="7730816" y="2238256"/>
+            <a:ext cx="407869" cy="215444"/>
+          </a:xfrm>
+          <a:prstGeom prst="rect">
+            <a:avLst/>
+          </a:prstGeom>
+          <a:noFill/>
+          <a:ln>
+            <a:noFill/>
+          </a:ln>
+        </p:spPr>
+        <p:txBody>
+          <a:bodyPr wrap="none" lIns="0" tIns="0" rIns="0" bIns="0" rtlCol="0">
+            <a:spAutoFit/>
+          </a:bodyPr>
+          <a:lstStyle/>
+          <a:p>
+            <a:r>
+              <a:rPr lang="en-GB" sz="1400" i="1" dirty="0">
+                <a:solidFill>
+                  <a:schemeClr val="tx2">
+                    <a:lumMod val="75000"/>
+                    <a:lumOff val="25000"/>
+                  </a:schemeClr>
+                </a:solidFill>
+              </a:rPr>
+              <a:t>outer</a:t>
+            </a:r>
+          </a:p>
+        </p:txBody>
+      </p:sp>
+      <p:sp>
+        <p:nvSpPr>
+          <p:cNvPr id="17" name="Oval 16">
+            <a:extLst>
+              <a:ext uri="{FF2B5EF4-FFF2-40B4-BE49-F238E27FC236}">
+                <a16:creationId xmlns:a16="http://schemas.microsoft.com/office/drawing/2014/main" id="{9A162325-5B41-534A-A3D4-5D150C7398D0}"/>
+              </a:ext>
+            </a:extLst>
+          </p:cNvPr>
+          <p:cNvSpPr/>
+          <p:nvPr/>
+        </p:nvSpPr>
+        <p:spPr>
+          <a:xfrm>
+            <a:off x="8393320" y="1946703"/>
+            <a:ext cx="1253120" cy="798551"/>
+          </a:xfrm>
+          <a:prstGeom prst="ellipse">
+            <a:avLst/>
+          </a:prstGeom>
+          <a:solidFill>
+            <a:schemeClr val="tx2">
+              <a:lumMod val="50000"/>
+              <a:lumOff val="50000"/>
+              <a:alpha val="5098"/>
+            </a:schemeClr>
+          </a:solidFill>
+          <a:ln>
+            <a:solidFill>
+              <a:schemeClr val="tx2">
+                <a:lumMod val="75000"/>
+                <a:lumOff val="25000"/>
+              </a:schemeClr>
+            </a:solidFill>
+          </a:ln>
+        </p:spPr>
+        <p:style>
+          <a:lnRef idx="2">
+            <a:schemeClr val="dk1">
+              <a:shade val="15000"/>
+            </a:schemeClr>
+          </a:lnRef>
+          <a:fillRef idx="1">
+            <a:schemeClr val="dk1"/>
+          </a:fillRef>
+          <a:effectRef idx="0">
+            <a:schemeClr val="dk1"/>
+          </a:effectRef>
+          <a:fontRef idx="minor">
+            <a:schemeClr val="lt1"/>
+          </a:fontRef>
+        </p:style>
+        <p:txBody>
+          <a:bodyPr wrap="square" lIns="0" tIns="0" rIns="0" bIns="0" rtlCol="0" anchor="t" anchorCtr="0"/>
+          <a:lstStyle/>
+          <a:p>
+            <a:pPr algn="ctr"/>
+            <a:endParaRPr lang="en-GB" sz="1400" dirty="0">
+              <a:solidFill>
+                <a:schemeClr val="accent4">
+                  <a:lumMod val="50000"/>
+                </a:schemeClr>
+              </a:solidFill>
+            </a:endParaRPr>
+          </a:p>
+        </p:txBody>
+      </p:sp>
+      <p:sp>
+        <p:nvSpPr>
+          <p:cNvPr id="18" name="TextBox 17">
+            <a:extLst>
+              <a:ext uri="{FF2B5EF4-FFF2-40B4-BE49-F238E27FC236}">
+                <a16:creationId xmlns:a16="http://schemas.microsoft.com/office/drawing/2014/main" id="{E461A1CE-99CB-5784-C40C-E789ABA6D1F6}"/>
+              </a:ext>
+            </a:extLst>
+          </p:cNvPr>
+          <p:cNvSpPr txBox="1"/>
+          <p:nvPr/>
+        </p:nvSpPr>
+        <p:spPr>
+          <a:xfrm>
+            <a:off x="8993299" y="2238256"/>
+            <a:ext cx="551739" cy="215444"/>
+          </a:xfrm>
+          <a:prstGeom prst="rect">
+            <a:avLst/>
+          </a:prstGeom>
+          <a:noFill/>
+          <a:ln>
+            <a:noFill/>
+          </a:ln>
+        </p:spPr>
+        <p:txBody>
+          <a:bodyPr wrap="square" lIns="0" tIns="0" rIns="0" bIns="0" rtlCol="0">
+            <a:spAutoFit/>
+          </a:bodyPr>
+          <a:lstStyle/>
+          <a:p>
+            <a:r>
+              <a:rPr lang="en-GB" sz="1400" i="1" dirty="0">
+                <a:solidFill>
+                  <a:schemeClr val="tx2">
+                    <a:lumMod val="75000"/>
+                    <a:lumOff val="25000"/>
+                  </a:schemeClr>
+                </a:solidFill>
+              </a:rPr>
+              <a:t>absent</a:t>
+            </a:r>
+          </a:p>
+        </p:txBody>
+      </p:sp>
+      <p:sp>
+        <p:nvSpPr>
+          <p:cNvPr id="21" name="Oval 20">
+            <a:extLst>
+              <a:ext uri="{FF2B5EF4-FFF2-40B4-BE49-F238E27FC236}">
+                <a16:creationId xmlns:a16="http://schemas.microsoft.com/office/drawing/2014/main" id="{8ED26522-3FBB-A3CA-848A-28136A63536D}"/>
+              </a:ext>
+            </a:extLst>
+          </p:cNvPr>
+          <p:cNvSpPr/>
+          <p:nvPr/>
+        </p:nvSpPr>
+        <p:spPr>
+          <a:xfrm>
+            <a:off x="7638777" y="1945515"/>
+            <a:ext cx="1253120" cy="798551"/>
+          </a:xfrm>
+          <a:prstGeom prst="ellipse">
+            <a:avLst/>
+          </a:prstGeom>
+          <a:solidFill>
+            <a:schemeClr val="tx2">
+              <a:lumMod val="50000"/>
+              <a:lumOff val="50000"/>
+              <a:alpha val="5098"/>
+            </a:schemeClr>
+          </a:solidFill>
+          <a:ln>
+            <a:solidFill>
+              <a:schemeClr val="tx2">
+                <a:lumMod val="75000"/>
+                <a:lumOff val="25000"/>
+              </a:schemeClr>
+            </a:solidFill>
+          </a:ln>
+        </p:spPr>
+        <p:style>
+          <a:lnRef idx="2">
+            <a:schemeClr val="dk1">
+              <a:shade val="15000"/>
+            </a:schemeClr>
+          </a:lnRef>
+          <a:fillRef idx="1">
+            <a:schemeClr val="dk1"/>
+          </a:fillRef>
+          <a:effectRef idx="0">
+            <a:schemeClr val="dk1"/>
+          </a:effectRef>
+          <a:fontRef idx="minor">
+            <a:schemeClr val="lt1"/>
+          </a:fontRef>
+        </p:style>
+        <p:txBody>
+          <a:bodyPr wrap="square" lIns="0" tIns="0" rIns="0" bIns="0" rtlCol="0" anchor="t" anchorCtr="0"/>
+          <a:lstStyle/>
+          <a:p>
+            <a:pPr algn="ctr"/>
+            <a:endParaRPr lang="en-GB" sz="1400" dirty="0">
+              <a:solidFill>
+                <a:schemeClr val="accent4">
+                  <a:lumMod val="50000"/>
+                </a:schemeClr>
+              </a:solidFill>
+            </a:endParaRPr>
           </a:p>
         </p:txBody>
       </p:sp>

</xml_diff>

<commit_message>
Further refinement of the exploration doc
</commit_message>
<xml_diff>
--- a/doc/exploration/figs/figs.pptx
+++ b/doc/exploration/figs/figs.pptx
@@ -3349,6 +3349,140 @@
       </p:grpSpPr>
       <p:sp>
         <p:nvSpPr>
+          <p:cNvPr id="25" name="Oval 24">
+            <a:extLst>
+              <a:ext uri="{FF2B5EF4-FFF2-40B4-BE49-F238E27FC236}">
+                <a16:creationId xmlns:a16="http://schemas.microsoft.com/office/drawing/2014/main" id="{82834FDE-6C90-0A21-AA85-5E86D5FB2086}"/>
+              </a:ext>
+            </a:extLst>
+          </p:cNvPr>
+          <p:cNvSpPr/>
+          <p:nvPr/>
+        </p:nvSpPr>
+        <p:spPr>
+          <a:xfrm>
+            <a:off x="7206742" y="1699099"/>
+            <a:ext cx="1897496" cy="1309990"/>
+          </a:xfrm>
+          <a:prstGeom prst="ellipse">
+            <a:avLst/>
+          </a:prstGeom>
+          <a:solidFill>
+            <a:schemeClr val="tx2">
+              <a:lumMod val="50000"/>
+              <a:lumOff val="50000"/>
+              <a:alpha val="5098"/>
+            </a:schemeClr>
+          </a:solidFill>
+          <a:ln>
+            <a:solidFill>
+              <a:schemeClr val="tx2">
+                <a:lumMod val="75000"/>
+                <a:lumOff val="25000"/>
+              </a:schemeClr>
+            </a:solidFill>
+          </a:ln>
+        </p:spPr>
+        <p:style>
+          <a:lnRef idx="2">
+            <a:schemeClr val="dk1">
+              <a:shade val="15000"/>
+            </a:schemeClr>
+          </a:lnRef>
+          <a:fillRef idx="1">
+            <a:schemeClr val="dk1"/>
+          </a:fillRef>
+          <a:effectRef idx="0">
+            <a:schemeClr val="dk1"/>
+          </a:effectRef>
+          <a:fontRef idx="minor">
+            <a:schemeClr val="lt1"/>
+          </a:fontRef>
+        </p:style>
+        <p:txBody>
+          <a:bodyPr wrap="square" lIns="0" tIns="0" rIns="0" bIns="0" rtlCol="0" anchor="t" anchorCtr="0"/>
+          <a:lstStyle/>
+          <a:p>
+            <a:pPr algn="ctr"/>
+            <a:endParaRPr lang="en-GB" sz="1400" dirty="0">
+              <a:solidFill>
+                <a:schemeClr val="accent4">
+                  <a:lumMod val="50000"/>
+                </a:schemeClr>
+              </a:solidFill>
+            </a:endParaRPr>
+          </a:p>
+        </p:txBody>
+      </p:sp>
+      <p:sp>
+        <p:nvSpPr>
+          <p:cNvPr id="21" name="Oval 20">
+            <a:extLst>
+              <a:ext uri="{FF2B5EF4-FFF2-40B4-BE49-F238E27FC236}">
+                <a16:creationId xmlns:a16="http://schemas.microsoft.com/office/drawing/2014/main" id="{8ED26522-3FBB-A3CA-848A-28136A63536D}"/>
+              </a:ext>
+            </a:extLst>
+          </p:cNvPr>
+          <p:cNvSpPr/>
+          <p:nvPr/>
+        </p:nvSpPr>
+        <p:spPr>
+          <a:xfrm>
+            <a:off x="7554472" y="1945515"/>
+            <a:ext cx="1253120" cy="798551"/>
+          </a:xfrm>
+          <a:prstGeom prst="ellipse">
+            <a:avLst/>
+          </a:prstGeom>
+          <a:solidFill>
+            <a:schemeClr val="tx2">
+              <a:lumMod val="50000"/>
+              <a:lumOff val="50000"/>
+              <a:alpha val="5098"/>
+            </a:schemeClr>
+          </a:solidFill>
+          <a:ln>
+            <a:solidFill>
+              <a:schemeClr val="tx2">
+                <a:lumMod val="75000"/>
+                <a:lumOff val="25000"/>
+              </a:schemeClr>
+            </a:solidFill>
+          </a:ln>
+        </p:spPr>
+        <p:style>
+          <a:lnRef idx="2">
+            <a:schemeClr val="dk1">
+              <a:shade val="15000"/>
+            </a:schemeClr>
+          </a:lnRef>
+          <a:fillRef idx="1">
+            <a:schemeClr val="dk1"/>
+          </a:fillRef>
+          <a:effectRef idx="0">
+            <a:schemeClr val="dk1"/>
+          </a:effectRef>
+          <a:fontRef idx="minor">
+            <a:schemeClr val="lt1"/>
+          </a:fontRef>
+        </p:style>
+        <p:txBody>
+          <a:bodyPr wrap="square" lIns="0" tIns="0" rIns="0" bIns="0" rtlCol="0" anchor="t" anchorCtr="0"/>
+          <a:lstStyle/>
+          <a:p>
+            <a:pPr algn="ctr"/>
+            <a:endParaRPr lang="en-GB" sz="1400" dirty="0">
+              <a:solidFill>
+                <a:schemeClr val="accent4">
+                  <a:lumMod val="50000"/>
+                </a:schemeClr>
+              </a:solidFill>
+            </a:endParaRPr>
+          </a:p>
+        </p:txBody>
+      </p:sp>
+      <p:sp>
+        <p:nvSpPr>
           <p:cNvPr id="8" name="Oval 7">
             <a:extLst>
               <a:ext uri="{FF2B5EF4-FFF2-40B4-BE49-F238E27FC236}">
@@ -4019,8 +4153,8 @@
         </p:nvSpPr>
         <p:spPr>
           <a:xfrm>
-            <a:off x="7730816" y="2238256"/>
-            <a:ext cx="407869" cy="215444"/>
+            <a:off x="7633541" y="2238256"/>
+            <a:ext cx="539315" cy="215444"/>
           </a:xfrm>
           <a:prstGeom prst="rect">
             <a:avLst/>
@@ -4045,7 +4179,7 @@
                   </a:schemeClr>
                 </a:solidFill>
               </a:rPr>
-              <a:t>outer</a:t>
+              <a:t>atomic</a:t>
             </a:r>
           </a:p>
         </p:txBody>
@@ -4064,7 +4198,7 @@
         </p:nvSpPr>
         <p:spPr>
           <a:xfrm>
-            <a:off x="8393320" y="1946703"/>
+            <a:off x="8516535" y="1946703"/>
             <a:ext cx="1253120" cy="798551"/>
           </a:xfrm>
           <a:prstGeom prst="ellipse">
@@ -4131,7 +4265,7 @@
         </p:nvSpPr>
         <p:spPr>
           <a:xfrm>
-            <a:off x="8993299" y="2238256"/>
+            <a:off x="9161077" y="2238256"/>
             <a:ext cx="551739" cy="215444"/>
           </a:xfrm>
           <a:prstGeom prst="rect">
@@ -4164,68 +4298,46 @@
       </p:sp>
       <p:sp>
         <p:nvSpPr>
-          <p:cNvPr id="21" name="Oval 20">
-            <a:extLst>
-              <a:ext uri="{FF2B5EF4-FFF2-40B4-BE49-F238E27FC236}">
-                <a16:creationId xmlns:a16="http://schemas.microsoft.com/office/drawing/2014/main" id="{8ED26522-3FBB-A3CA-848A-28136A63536D}"/>
-              </a:ext>
-            </a:extLst>
-          </p:cNvPr>
-          <p:cNvSpPr/>
+          <p:cNvPr id="26" name="TextBox 25">
+            <a:extLst>
+              <a:ext uri="{FF2B5EF4-FFF2-40B4-BE49-F238E27FC236}">
+                <a16:creationId xmlns:a16="http://schemas.microsoft.com/office/drawing/2014/main" id="{93746795-33A0-0FF3-AAD3-5A521A56F217}"/>
+              </a:ext>
+            </a:extLst>
+          </p:cNvPr>
+          <p:cNvSpPr txBox="1"/>
           <p:nvPr/>
         </p:nvSpPr>
         <p:spPr>
           <a:xfrm>
-            <a:off x="7638777" y="1945515"/>
-            <a:ext cx="1253120" cy="798551"/>
+            <a:off x="7951556" y="1723400"/>
+            <a:ext cx="407869" cy="215444"/>
           </a:xfrm>
-          <a:prstGeom prst="ellipse">
+          <a:prstGeom prst="rect">
             <a:avLst/>
           </a:prstGeom>
-          <a:solidFill>
-            <a:schemeClr val="tx2">
-              <a:lumMod val="50000"/>
-              <a:lumOff val="50000"/>
-              <a:alpha val="5098"/>
-            </a:schemeClr>
-          </a:solidFill>
+          <a:noFill/>
           <a:ln>
-            <a:solidFill>
-              <a:schemeClr val="tx2">
-                <a:lumMod val="75000"/>
-                <a:lumOff val="25000"/>
-              </a:schemeClr>
-            </a:solidFill>
+            <a:noFill/>
           </a:ln>
         </p:spPr>
-        <p:style>
-          <a:lnRef idx="2">
-            <a:schemeClr val="dk1">
-              <a:shade val="15000"/>
-            </a:schemeClr>
-          </a:lnRef>
-          <a:fillRef idx="1">
-            <a:schemeClr val="dk1"/>
-          </a:fillRef>
-          <a:effectRef idx="0">
-            <a:schemeClr val="dk1"/>
-          </a:effectRef>
-          <a:fontRef idx="minor">
-            <a:schemeClr val="lt1"/>
-          </a:fontRef>
-        </p:style>
-        <p:txBody>
-          <a:bodyPr wrap="square" lIns="0" tIns="0" rIns="0" bIns="0" rtlCol="0" anchor="t" anchorCtr="0"/>
-          <a:lstStyle/>
-          <a:p>
-            <a:pPr algn="ctr"/>
-            <a:endParaRPr lang="en-GB" sz="1400" dirty="0">
-              <a:solidFill>
-                <a:schemeClr val="accent4">
-                  <a:lumMod val="50000"/>
-                </a:schemeClr>
-              </a:solidFill>
-            </a:endParaRPr>
+        <p:txBody>
+          <a:bodyPr wrap="none" lIns="0" tIns="0" rIns="0" bIns="0" rtlCol="0">
+            <a:spAutoFit/>
+          </a:bodyPr>
+          <a:lstStyle/>
+          <a:p>
+            <a:r>
+              <a:rPr lang="en-GB" sz="1400" i="1" dirty="0">
+                <a:solidFill>
+                  <a:schemeClr val="tx2">
+                    <a:lumMod val="75000"/>
+                    <a:lumOff val="25000"/>
+                  </a:schemeClr>
+                </a:solidFill>
+              </a:rPr>
+              <a:t>outer</a:t>
+            </a:r>
           </a:p>
         </p:txBody>
       </p:sp>

</xml_diff>